<commit_message>
"kivesszuk" kód az előadásban
</commit_message>
<xml_diff>
--- a/CP_Dolgozat/Előadás/Logikai feladványok megoldása korlátprogramozással.pptx
+++ b/CP_Dolgozat/Előadás/Logikai feladványok megoldása korlátprogramozással.pptx
@@ -4008,6 +4008,42 @@
           <a:chExt cx="0" cy="0"/>
         </a:xfrm>
       </p:grpSpPr>
+      <p:pic>
+        <p:nvPicPr>
+          <p:cNvPr id="7" name="Kép 6">
+            <a:extLst>
+              <a:ext uri="{FF2B5EF4-FFF2-40B4-BE49-F238E27FC236}">
+                <a16:creationId xmlns:a16="http://schemas.microsoft.com/office/drawing/2014/main" id="{7A0344BB-0EF5-4717-A847-ACC7A7E9F3CC}"/>
+              </a:ext>
+            </a:extLst>
+          </p:cNvPr>
+          <p:cNvPicPr>
+            <a:picLocks noChangeAspect="1"/>
+          </p:cNvPicPr>
+          <p:nvPr/>
+        </p:nvPicPr>
+        <p:blipFill>
+          <a:blip r:embed="rId2">
+            <a:extLst>
+              <a:ext uri="{28A0092B-C50C-407E-A947-70E740481C1C}">
+                <a14:useLocalDpi xmlns:a14="http://schemas.microsoft.com/office/drawing/2010/main" val="0"/>
+              </a:ext>
+            </a:extLst>
+          </a:blip>
+          <a:stretch>
+            <a:fillRect/>
+          </a:stretch>
+        </p:blipFill>
+        <p:spPr>
+          <a:xfrm>
+            <a:off x="266699" y="1462444"/>
+            <a:ext cx="5471161" cy="1401810"/>
+          </a:xfrm>
+          <a:prstGeom prst="rect">
+            <a:avLst/>
+          </a:prstGeom>
+        </p:spPr>
+      </p:pic>
       <p:sp>
         <p:nvSpPr>
           <p:cNvPr id="2" name="Cím 1">
@@ -4024,7 +4060,12 @@
             <p:ph type="title"/>
           </p:nvPr>
         </p:nvSpPr>
-        <p:spPr/>
+        <p:spPr>
+          <a:xfrm>
+            <a:off x="628649" y="0"/>
+            <a:ext cx="7886700" cy="1325563"/>
+          </a:xfrm>
+        </p:spPr>
         <p:txBody>
           <a:bodyPr/>
           <a:lstStyle/>
@@ -4080,7 +4121,7 @@
         </p:nvSpPr>
         <p:spPr>
           <a:xfrm>
-            <a:off x="114300" y="2282992"/>
+            <a:off x="85022" y="959904"/>
             <a:ext cx="8867274" cy="400110"/>
           </a:xfrm>
           <a:prstGeom prst="rect">
@@ -4124,14 +4165,14 @@
           <p:nvPr>
             <p:extLst>
               <p:ext uri="{D42A27DB-BD31-4B8C-83A1-F6EECF244321}">
-                <p14:modId xmlns:p14="http://schemas.microsoft.com/office/powerpoint/2010/main" val="2486973129"/>
+                <p14:modId xmlns:p14="http://schemas.microsoft.com/office/powerpoint/2010/main" val="3231484753"/>
               </p:ext>
             </p:extLst>
           </p:nvPr>
         </p:nvGraphicFramePr>
         <p:xfrm>
-          <a:off x="1796759" y="2684738"/>
-          <a:ext cx="5550481" cy="3673922"/>
+          <a:off x="3267419" y="2955904"/>
+          <a:ext cx="5388900" cy="3673922"/>
         </p:xfrm>
         <a:graphic>
           <a:graphicData uri="http://schemas.openxmlformats.org/drawingml/2006/table">
@@ -4140,28 +4181,28 @@
                 <a:tableStyleId>{5C22544A-7EE6-4342-B048-85BDC9FD1C3A}</a:tableStyleId>
               </a:tblPr>
               <a:tblGrid>
-                <a:gridCol w="1264299">
+                <a:gridCol w="1227494">
                   <a:extLst>
                     <a:ext uri="{9D8B030D-6E8A-4147-A177-3AD203B41FA5}">
                       <a16:colId xmlns:a16="http://schemas.microsoft.com/office/drawing/2014/main" val="2069922602"/>
                     </a:ext>
                   </a:extLst>
                 </a:gridCol>
-                <a:gridCol w="1365216">
+                <a:gridCol w="1325473">
                   <a:extLst>
                     <a:ext uri="{9D8B030D-6E8A-4147-A177-3AD203B41FA5}">
                       <a16:colId xmlns:a16="http://schemas.microsoft.com/office/drawing/2014/main" val="2732399375"/>
                     </a:ext>
                   </a:extLst>
                 </a:gridCol>
-                <a:gridCol w="1515382">
+                <a:gridCol w="1471267">
                   <a:extLst>
                     <a:ext uri="{9D8B030D-6E8A-4147-A177-3AD203B41FA5}">
                       <a16:colId xmlns:a16="http://schemas.microsoft.com/office/drawing/2014/main" val="1486601713"/>
                     </a:ext>
                   </a:extLst>
                 </a:gridCol>
-                <a:gridCol w="1405584">
+                <a:gridCol w="1364666">
                   <a:extLst>
                     <a:ext uri="{9D8B030D-6E8A-4147-A177-3AD203B41FA5}">
                       <a16:colId xmlns:a16="http://schemas.microsoft.com/office/drawing/2014/main" val="3795495708"/>
@@ -4169,7 +4210,7 @@
                   </a:extLst>
                 </a:gridCol>
               </a:tblGrid>
-              <a:tr h="271398">
+              <a:tr h="555482">
                 <a:tc>
                   <a:txBody>
                     <a:bodyPr/>
@@ -4365,7 +4406,7 @@
                   </a:ext>
                 </a:extLst>
               </a:tr>
-              <a:tr h="1183092">
+              <a:tr h="1143393">
                 <a:tc>
                   <a:txBody>
                     <a:bodyPr/>
@@ -4492,7 +4533,7 @@
                   </a:ext>
                 </a:extLst>
               </a:tr>
-              <a:tr h="575296">
+              <a:tr h="556530">
                 <a:tc>
                   <a:txBody>
                     <a:bodyPr/>
@@ -4571,12 +4612,12 @@
                         </a:spcAft>
                       </a:pPr>
                       <a:r>
-                        <a:rPr lang="hu-HU" sz="2400">
+                        <a:rPr lang="hu-HU" sz="2400" dirty="0">
                           <a:effectLst/>
                         </a:rPr>
                         <a:t>15</a:t>
                       </a:r>
-                      <a:endParaRPr lang="hu-HU" sz="2400">
+                      <a:endParaRPr lang="hu-HU" sz="2400" dirty="0">
                         <a:effectLst/>
                         <a:latin typeface="Times New Roman" panose="02020603050405020304" pitchFamily="18" charset="0"/>
                         <a:ea typeface="Times New Roman" panose="02020603050405020304" pitchFamily="18" charset="0"/>
@@ -4619,7 +4660,7 @@
                   </a:ext>
                 </a:extLst>
               </a:tr>
-              <a:tr h="575296">
+              <a:tr h="556530">
                 <a:tc>
                   <a:txBody>
                     <a:bodyPr/>
@@ -4746,7 +4787,7 @@
                   </a:ext>
                 </a:extLst>
               </a:tr>
-              <a:tr h="575296">
+              <a:tr h="556530">
                 <a:tc>
                   <a:txBody>
                     <a:bodyPr/>

</xml_diff>